<commit_message>
error in line17 delete radius
</commit_message>
<xml_diff>
--- a/Programming Assignment for Chapter 18.pptx
+++ b/Programming Assignment for Chapter 18.pptx
@@ -156,10 +156,9 @@
           </a:lstStyle>
           <a:p>
             <a:r>
-              <a:rPr lang="zh-TW" altLang="en-US" smtClean="0"/>
+              <a:rPr lang="zh-TW" altLang="en-US"/>
               <a:t>按一下以編輯母片標題樣式</a:t>
             </a:r>
-            <a:endParaRPr lang="zh-TW" altLang="en-US"/>
           </a:p>
         </p:txBody>
       </p:sp>
@@ -221,10 +220,9 @@
           </a:lstStyle>
           <a:p>
             <a:r>
-              <a:rPr lang="zh-TW" altLang="en-US" smtClean="0"/>
+              <a:rPr lang="zh-TW" altLang="en-US"/>
               <a:t>按一下以編輯母片副標題樣式</a:t>
             </a:r>
-            <a:endParaRPr lang="zh-TW" altLang="en-US"/>
           </a:p>
         </p:txBody>
       </p:sp>
@@ -245,7 +243,7 @@
           <a:p>
             <a:fld id="{5579B680-425F-405A-87B3-AF7CB6D33E03}" type="datetimeFigureOut">
               <a:rPr lang="zh-TW" altLang="en-US" smtClean="0"/>
-              <a:t>2022/5/25</a:t>
+              <a:t>2022/6/9</a:t>
             </a:fld>
             <a:endParaRPr lang="zh-TW" altLang="en-US"/>
           </a:p>
@@ -339,10 +337,9 @@
           <a:lstStyle/>
           <a:p>
             <a:r>
-              <a:rPr lang="zh-TW" altLang="en-US" smtClean="0"/>
+              <a:rPr lang="zh-TW" altLang="en-US"/>
               <a:t>按一下以編輯母片標題樣式</a:t>
             </a:r>
-            <a:endParaRPr lang="zh-TW" altLang="en-US"/>
           </a:p>
         </p:txBody>
       </p:sp>
@@ -363,38 +360,37 @@
           <a:p>
             <a:pPr lvl="0"/>
             <a:r>
-              <a:rPr lang="zh-TW" altLang="en-US" smtClean="0"/>
+              <a:rPr lang="zh-TW" altLang="en-US"/>
               <a:t>編輯母片文字樣式</a:t>
             </a:r>
           </a:p>
           <a:p>
             <a:pPr lvl="1"/>
             <a:r>
-              <a:rPr lang="zh-TW" altLang="en-US" smtClean="0"/>
+              <a:rPr lang="zh-TW" altLang="en-US"/>
               <a:t>第二層</a:t>
             </a:r>
           </a:p>
           <a:p>
             <a:pPr lvl="2"/>
             <a:r>
-              <a:rPr lang="zh-TW" altLang="en-US" smtClean="0"/>
+              <a:rPr lang="zh-TW" altLang="en-US"/>
               <a:t>第三層</a:t>
             </a:r>
           </a:p>
           <a:p>
             <a:pPr lvl="3"/>
             <a:r>
-              <a:rPr lang="zh-TW" altLang="en-US" smtClean="0"/>
+              <a:rPr lang="zh-TW" altLang="en-US"/>
               <a:t>第四層</a:t>
             </a:r>
           </a:p>
           <a:p>
             <a:pPr lvl="4"/>
             <a:r>
-              <a:rPr lang="zh-TW" altLang="en-US" smtClean="0"/>
+              <a:rPr lang="zh-TW" altLang="en-US"/>
               <a:t>第五層</a:t>
             </a:r>
-            <a:endParaRPr lang="zh-TW" altLang="en-US"/>
           </a:p>
         </p:txBody>
       </p:sp>
@@ -415,7 +411,7 @@
           <a:p>
             <a:fld id="{5579B680-425F-405A-87B3-AF7CB6D33E03}" type="datetimeFigureOut">
               <a:rPr lang="zh-TW" altLang="en-US" smtClean="0"/>
-              <a:t>2022/5/25</a:t>
+              <a:t>2022/6/9</a:t>
             </a:fld>
             <a:endParaRPr lang="zh-TW" altLang="en-US"/>
           </a:p>
@@ -514,10 +510,9 @@
           <a:lstStyle/>
           <a:p>
             <a:r>
-              <a:rPr lang="zh-TW" altLang="en-US" smtClean="0"/>
+              <a:rPr lang="zh-TW" altLang="en-US"/>
               <a:t>按一下以編輯母片標題樣式</a:t>
             </a:r>
-            <a:endParaRPr lang="zh-TW" altLang="en-US"/>
           </a:p>
         </p:txBody>
       </p:sp>
@@ -543,38 +538,37 @@
           <a:p>
             <a:pPr lvl="0"/>
             <a:r>
-              <a:rPr lang="zh-TW" altLang="en-US" smtClean="0"/>
+              <a:rPr lang="zh-TW" altLang="en-US"/>
               <a:t>編輯母片文字樣式</a:t>
             </a:r>
           </a:p>
           <a:p>
             <a:pPr lvl="1"/>
             <a:r>
-              <a:rPr lang="zh-TW" altLang="en-US" smtClean="0"/>
+              <a:rPr lang="zh-TW" altLang="en-US"/>
               <a:t>第二層</a:t>
             </a:r>
           </a:p>
           <a:p>
             <a:pPr lvl="2"/>
             <a:r>
-              <a:rPr lang="zh-TW" altLang="en-US" smtClean="0"/>
+              <a:rPr lang="zh-TW" altLang="en-US"/>
               <a:t>第三層</a:t>
             </a:r>
           </a:p>
           <a:p>
             <a:pPr lvl="3"/>
             <a:r>
-              <a:rPr lang="zh-TW" altLang="en-US" smtClean="0"/>
+              <a:rPr lang="zh-TW" altLang="en-US"/>
               <a:t>第四層</a:t>
             </a:r>
           </a:p>
           <a:p>
             <a:pPr lvl="4"/>
             <a:r>
-              <a:rPr lang="zh-TW" altLang="en-US" smtClean="0"/>
+              <a:rPr lang="zh-TW" altLang="en-US"/>
               <a:t>第五層</a:t>
             </a:r>
-            <a:endParaRPr lang="zh-TW" altLang="en-US"/>
           </a:p>
         </p:txBody>
       </p:sp>
@@ -595,7 +589,7 @@
           <a:p>
             <a:fld id="{5579B680-425F-405A-87B3-AF7CB6D33E03}" type="datetimeFigureOut">
               <a:rPr lang="zh-TW" altLang="en-US" smtClean="0"/>
-              <a:t>2022/5/25</a:t>
+              <a:t>2022/6/9</a:t>
             </a:fld>
             <a:endParaRPr lang="zh-TW" altLang="en-US"/>
           </a:p>
@@ -689,10 +683,9 @@
           <a:lstStyle/>
           <a:p>
             <a:r>
-              <a:rPr lang="zh-TW" altLang="en-US" smtClean="0"/>
+              <a:rPr lang="zh-TW" altLang="en-US"/>
               <a:t>按一下以編輯母片標題樣式</a:t>
             </a:r>
-            <a:endParaRPr lang="zh-TW" altLang="en-US"/>
           </a:p>
         </p:txBody>
       </p:sp>
@@ -713,38 +706,37 @@
           <a:p>
             <a:pPr lvl="0"/>
             <a:r>
-              <a:rPr lang="zh-TW" altLang="en-US" smtClean="0"/>
+              <a:rPr lang="zh-TW" altLang="en-US"/>
               <a:t>編輯母片文字樣式</a:t>
             </a:r>
           </a:p>
           <a:p>
             <a:pPr lvl="1"/>
             <a:r>
-              <a:rPr lang="zh-TW" altLang="en-US" smtClean="0"/>
+              <a:rPr lang="zh-TW" altLang="en-US"/>
               <a:t>第二層</a:t>
             </a:r>
           </a:p>
           <a:p>
             <a:pPr lvl="2"/>
             <a:r>
-              <a:rPr lang="zh-TW" altLang="en-US" smtClean="0"/>
+              <a:rPr lang="zh-TW" altLang="en-US"/>
               <a:t>第三層</a:t>
             </a:r>
           </a:p>
           <a:p>
             <a:pPr lvl="3"/>
             <a:r>
-              <a:rPr lang="zh-TW" altLang="en-US" smtClean="0"/>
+              <a:rPr lang="zh-TW" altLang="en-US"/>
               <a:t>第四層</a:t>
             </a:r>
           </a:p>
           <a:p>
             <a:pPr lvl="4"/>
             <a:r>
-              <a:rPr lang="zh-TW" altLang="en-US" smtClean="0"/>
+              <a:rPr lang="zh-TW" altLang="en-US"/>
               <a:t>第五層</a:t>
             </a:r>
-            <a:endParaRPr lang="zh-TW" altLang="en-US"/>
           </a:p>
         </p:txBody>
       </p:sp>
@@ -765,7 +757,7 @@
           <a:p>
             <a:fld id="{5579B680-425F-405A-87B3-AF7CB6D33E03}" type="datetimeFigureOut">
               <a:rPr lang="zh-TW" altLang="en-US" smtClean="0"/>
-              <a:t>2022/5/25</a:t>
+              <a:t>2022/6/9</a:t>
             </a:fld>
             <a:endParaRPr lang="zh-TW" altLang="en-US"/>
           </a:p>
@@ -868,10 +860,9 @@
           </a:lstStyle>
           <a:p>
             <a:r>
-              <a:rPr lang="zh-TW" altLang="en-US" smtClean="0"/>
+              <a:rPr lang="zh-TW" altLang="en-US"/>
               <a:t>按一下以編輯母片標題樣式</a:t>
             </a:r>
-            <a:endParaRPr lang="zh-TW" altLang="en-US"/>
           </a:p>
         </p:txBody>
       </p:sp>
@@ -988,7 +979,7 @@
           <a:p>
             <a:pPr lvl="0"/>
             <a:r>
-              <a:rPr lang="zh-TW" altLang="en-US" smtClean="0"/>
+              <a:rPr lang="zh-TW" altLang="en-US"/>
               <a:t>編輯母片文字樣式</a:t>
             </a:r>
           </a:p>
@@ -1011,7 +1002,7 @@
           <a:p>
             <a:fld id="{5579B680-425F-405A-87B3-AF7CB6D33E03}" type="datetimeFigureOut">
               <a:rPr lang="zh-TW" altLang="en-US" smtClean="0"/>
-              <a:t>2022/5/25</a:t>
+              <a:t>2022/6/9</a:t>
             </a:fld>
             <a:endParaRPr lang="zh-TW" altLang="en-US"/>
           </a:p>
@@ -1105,10 +1096,9 @@
           <a:lstStyle/>
           <a:p>
             <a:r>
-              <a:rPr lang="zh-TW" altLang="en-US" smtClean="0"/>
+              <a:rPr lang="zh-TW" altLang="en-US"/>
               <a:t>按一下以編輯母片標題樣式</a:t>
             </a:r>
-            <a:endParaRPr lang="zh-TW" altLang="en-US"/>
           </a:p>
         </p:txBody>
       </p:sp>
@@ -1134,38 +1124,37 @@
           <a:p>
             <a:pPr lvl="0"/>
             <a:r>
-              <a:rPr lang="zh-TW" altLang="en-US" smtClean="0"/>
+              <a:rPr lang="zh-TW" altLang="en-US"/>
               <a:t>編輯母片文字樣式</a:t>
             </a:r>
           </a:p>
           <a:p>
             <a:pPr lvl="1"/>
             <a:r>
-              <a:rPr lang="zh-TW" altLang="en-US" smtClean="0"/>
+              <a:rPr lang="zh-TW" altLang="en-US"/>
               <a:t>第二層</a:t>
             </a:r>
           </a:p>
           <a:p>
             <a:pPr lvl="2"/>
             <a:r>
-              <a:rPr lang="zh-TW" altLang="en-US" smtClean="0"/>
+              <a:rPr lang="zh-TW" altLang="en-US"/>
               <a:t>第三層</a:t>
             </a:r>
           </a:p>
           <a:p>
             <a:pPr lvl="3"/>
             <a:r>
-              <a:rPr lang="zh-TW" altLang="en-US" smtClean="0"/>
+              <a:rPr lang="zh-TW" altLang="en-US"/>
               <a:t>第四層</a:t>
             </a:r>
           </a:p>
           <a:p>
             <a:pPr lvl="4"/>
             <a:r>
-              <a:rPr lang="zh-TW" altLang="en-US" smtClean="0"/>
+              <a:rPr lang="zh-TW" altLang="en-US"/>
               <a:t>第五層</a:t>
             </a:r>
-            <a:endParaRPr lang="zh-TW" altLang="en-US"/>
           </a:p>
         </p:txBody>
       </p:sp>
@@ -1191,38 +1180,37 @@
           <a:p>
             <a:pPr lvl="0"/>
             <a:r>
-              <a:rPr lang="zh-TW" altLang="en-US" smtClean="0"/>
+              <a:rPr lang="zh-TW" altLang="en-US"/>
               <a:t>編輯母片文字樣式</a:t>
             </a:r>
           </a:p>
           <a:p>
             <a:pPr lvl="1"/>
             <a:r>
-              <a:rPr lang="zh-TW" altLang="en-US" smtClean="0"/>
+              <a:rPr lang="zh-TW" altLang="en-US"/>
               <a:t>第二層</a:t>
             </a:r>
           </a:p>
           <a:p>
             <a:pPr lvl="2"/>
             <a:r>
-              <a:rPr lang="zh-TW" altLang="en-US" smtClean="0"/>
+              <a:rPr lang="zh-TW" altLang="en-US"/>
               <a:t>第三層</a:t>
             </a:r>
           </a:p>
           <a:p>
             <a:pPr lvl="3"/>
             <a:r>
-              <a:rPr lang="zh-TW" altLang="en-US" smtClean="0"/>
+              <a:rPr lang="zh-TW" altLang="en-US"/>
               <a:t>第四層</a:t>
             </a:r>
           </a:p>
           <a:p>
             <a:pPr lvl="4"/>
             <a:r>
-              <a:rPr lang="zh-TW" altLang="en-US" smtClean="0"/>
+              <a:rPr lang="zh-TW" altLang="en-US"/>
               <a:t>第五層</a:t>
             </a:r>
-            <a:endParaRPr lang="zh-TW" altLang="en-US"/>
           </a:p>
         </p:txBody>
       </p:sp>
@@ -1243,7 +1231,7 @@
           <a:p>
             <a:fld id="{5579B680-425F-405A-87B3-AF7CB6D33E03}" type="datetimeFigureOut">
               <a:rPr lang="zh-TW" altLang="en-US" smtClean="0"/>
-              <a:t>2022/5/25</a:t>
+              <a:t>2022/6/9</a:t>
             </a:fld>
             <a:endParaRPr lang="zh-TW" altLang="en-US"/>
           </a:p>
@@ -1342,10 +1330,9 @@
           <a:lstStyle/>
           <a:p>
             <a:r>
-              <a:rPr lang="zh-TW" altLang="en-US" smtClean="0"/>
+              <a:rPr lang="zh-TW" altLang="en-US"/>
               <a:t>按一下以編輯母片標題樣式</a:t>
             </a:r>
-            <a:endParaRPr lang="zh-TW" altLang="en-US"/>
           </a:p>
         </p:txBody>
       </p:sp>
@@ -1408,7 +1395,7 @@
           <a:p>
             <a:pPr lvl="0"/>
             <a:r>
-              <a:rPr lang="zh-TW" altLang="en-US" smtClean="0"/>
+              <a:rPr lang="zh-TW" altLang="en-US"/>
               <a:t>編輯母片文字樣式</a:t>
             </a:r>
           </a:p>
@@ -1436,38 +1423,37 @@
           <a:p>
             <a:pPr lvl="0"/>
             <a:r>
-              <a:rPr lang="zh-TW" altLang="en-US" smtClean="0"/>
+              <a:rPr lang="zh-TW" altLang="en-US"/>
               <a:t>編輯母片文字樣式</a:t>
             </a:r>
           </a:p>
           <a:p>
             <a:pPr lvl="1"/>
             <a:r>
-              <a:rPr lang="zh-TW" altLang="en-US" smtClean="0"/>
+              <a:rPr lang="zh-TW" altLang="en-US"/>
               <a:t>第二層</a:t>
             </a:r>
           </a:p>
           <a:p>
             <a:pPr lvl="2"/>
             <a:r>
-              <a:rPr lang="zh-TW" altLang="en-US" smtClean="0"/>
+              <a:rPr lang="zh-TW" altLang="en-US"/>
               <a:t>第三層</a:t>
             </a:r>
           </a:p>
           <a:p>
             <a:pPr lvl="3"/>
             <a:r>
-              <a:rPr lang="zh-TW" altLang="en-US" smtClean="0"/>
+              <a:rPr lang="zh-TW" altLang="en-US"/>
               <a:t>第四層</a:t>
             </a:r>
           </a:p>
           <a:p>
             <a:pPr lvl="4"/>
             <a:r>
-              <a:rPr lang="zh-TW" altLang="en-US" smtClean="0"/>
+              <a:rPr lang="zh-TW" altLang="en-US"/>
               <a:t>第五層</a:t>
             </a:r>
-            <a:endParaRPr lang="zh-TW" altLang="en-US"/>
           </a:p>
         </p:txBody>
       </p:sp>
@@ -1530,7 +1516,7 @@
           <a:p>
             <a:pPr lvl="0"/>
             <a:r>
-              <a:rPr lang="zh-TW" altLang="en-US" smtClean="0"/>
+              <a:rPr lang="zh-TW" altLang="en-US"/>
               <a:t>編輯母片文字樣式</a:t>
             </a:r>
           </a:p>
@@ -1558,38 +1544,37 @@
           <a:p>
             <a:pPr lvl="0"/>
             <a:r>
-              <a:rPr lang="zh-TW" altLang="en-US" smtClean="0"/>
+              <a:rPr lang="zh-TW" altLang="en-US"/>
               <a:t>編輯母片文字樣式</a:t>
             </a:r>
           </a:p>
           <a:p>
             <a:pPr lvl="1"/>
             <a:r>
-              <a:rPr lang="zh-TW" altLang="en-US" smtClean="0"/>
+              <a:rPr lang="zh-TW" altLang="en-US"/>
               <a:t>第二層</a:t>
             </a:r>
           </a:p>
           <a:p>
             <a:pPr lvl="2"/>
             <a:r>
-              <a:rPr lang="zh-TW" altLang="en-US" smtClean="0"/>
+              <a:rPr lang="zh-TW" altLang="en-US"/>
               <a:t>第三層</a:t>
             </a:r>
           </a:p>
           <a:p>
             <a:pPr lvl="3"/>
             <a:r>
-              <a:rPr lang="zh-TW" altLang="en-US" smtClean="0"/>
+              <a:rPr lang="zh-TW" altLang="en-US"/>
               <a:t>第四層</a:t>
             </a:r>
           </a:p>
           <a:p>
             <a:pPr lvl="4"/>
             <a:r>
-              <a:rPr lang="zh-TW" altLang="en-US" smtClean="0"/>
+              <a:rPr lang="zh-TW" altLang="en-US"/>
               <a:t>第五層</a:t>
             </a:r>
-            <a:endParaRPr lang="zh-TW" altLang="en-US"/>
           </a:p>
         </p:txBody>
       </p:sp>
@@ -1610,7 +1595,7 @@
           <a:p>
             <a:fld id="{5579B680-425F-405A-87B3-AF7CB6D33E03}" type="datetimeFigureOut">
               <a:rPr lang="zh-TW" altLang="en-US" smtClean="0"/>
-              <a:t>2022/5/25</a:t>
+              <a:t>2022/6/9</a:t>
             </a:fld>
             <a:endParaRPr lang="zh-TW" altLang="en-US"/>
           </a:p>
@@ -1704,10 +1689,9 @@
           <a:lstStyle/>
           <a:p>
             <a:r>
-              <a:rPr lang="zh-TW" altLang="en-US" smtClean="0"/>
+              <a:rPr lang="zh-TW" altLang="en-US"/>
               <a:t>按一下以編輯母片標題樣式</a:t>
             </a:r>
-            <a:endParaRPr lang="zh-TW" altLang="en-US"/>
           </a:p>
         </p:txBody>
       </p:sp>
@@ -1728,7 +1712,7 @@
           <a:p>
             <a:fld id="{5579B680-425F-405A-87B3-AF7CB6D33E03}" type="datetimeFigureOut">
               <a:rPr lang="zh-TW" altLang="en-US" smtClean="0"/>
-              <a:t>2022/5/25</a:t>
+              <a:t>2022/6/9</a:t>
             </a:fld>
             <a:endParaRPr lang="zh-TW" altLang="en-US"/>
           </a:p>
@@ -1823,7 +1807,7 @@
           <a:p>
             <a:fld id="{5579B680-425F-405A-87B3-AF7CB6D33E03}" type="datetimeFigureOut">
               <a:rPr lang="zh-TW" altLang="en-US" smtClean="0"/>
-              <a:t>2022/5/25</a:t>
+              <a:t>2022/6/9</a:t>
             </a:fld>
             <a:endParaRPr lang="zh-TW" altLang="en-US"/>
           </a:p>
@@ -1926,10 +1910,9 @@
           </a:lstStyle>
           <a:p>
             <a:r>
-              <a:rPr lang="zh-TW" altLang="en-US" smtClean="0"/>
+              <a:rPr lang="zh-TW" altLang="en-US"/>
               <a:t>按一下以編輯母片標題樣式</a:t>
             </a:r>
-            <a:endParaRPr lang="zh-TW" altLang="en-US"/>
           </a:p>
         </p:txBody>
       </p:sp>
@@ -1983,38 +1966,37 @@
           <a:p>
             <a:pPr lvl="0"/>
             <a:r>
-              <a:rPr lang="zh-TW" altLang="en-US" smtClean="0"/>
+              <a:rPr lang="zh-TW" altLang="en-US"/>
               <a:t>編輯母片文字樣式</a:t>
             </a:r>
           </a:p>
           <a:p>
             <a:pPr lvl="1"/>
             <a:r>
-              <a:rPr lang="zh-TW" altLang="en-US" smtClean="0"/>
+              <a:rPr lang="zh-TW" altLang="en-US"/>
               <a:t>第二層</a:t>
             </a:r>
           </a:p>
           <a:p>
             <a:pPr lvl="2"/>
             <a:r>
-              <a:rPr lang="zh-TW" altLang="en-US" smtClean="0"/>
+              <a:rPr lang="zh-TW" altLang="en-US"/>
               <a:t>第三層</a:t>
             </a:r>
           </a:p>
           <a:p>
             <a:pPr lvl="3"/>
             <a:r>
-              <a:rPr lang="zh-TW" altLang="en-US" smtClean="0"/>
+              <a:rPr lang="zh-TW" altLang="en-US"/>
               <a:t>第四層</a:t>
             </a:r>
           </a:p>
           <a:p>
             <a:pPr lvl="4"/>
             <a:r>
-              <a:rPr lang="zh-TW" altLang="en-US" smtClean="0"/>
+              <a:rPr lang="zh-TW" altLang="en-US"/>
               <a:t>第五層</a:t>
             </a:r>
-            <a:endParaRPr lang="zh-TW" altLang="en-US"/>
           </a:p>
         </p:txBody>
       </p:sp>
@@ -2077,7 +2059,7 @@
           <a:p>
             <a:pPr lvl="0"/>
             <a:r>
-              <a:rPr lang="zh-TW" altLang="en-US" smtClean="0"/>
+              <a:rPr lang="zh-TW" altLang="en-US"/>
               <a:t>編輯母片文字樣式</a:t>
             </a:r>
           </a:p>
@@ -2100,7 +2082,7 @@
           <a:p>
             <a:fld id="{5579B680-425F-405A-87B3-AF7CB6D33E03}" type="datetimeFigureOut">
               <a:rPr lang="zh-TW" altLang="en-US" smtClean="0"/>
-              <a:t>2022/5/25</a:t>
+              <a:t>2022/6/9</a:t>
             </a:fld>
             <a:endParaRPr lang="zh-TW" altLang="en-US"/>
           </a:p>
@@ -2203,10 +2185,9 @@
           </a:lstStyle>
           <a:p>
             <a:r>
-              <a:rPr lang="zh-TW" altLang="en-US" smtClean="0"/>
+              <a:rPr lang="zh-TW" altLang="en-US"/>
               <a:t>按一下以編輯母片標題樣式</a:t>
             </a:r>
-            <a:endParaRPr lang="zh-TW" altLang="en-US"/>
           </a:p>
         </p:txBody>
       </p:sp>
@@ -2330,7 +2311,7 @@
           <a:p>
             <a:pPr lvl="0"/>
             <a:r>
-              <a:rPr lang="zh-TW" altLang="en-US" smtClean="0"/>
+              <a:rPr lang="zh-TW" altLang="en-US"/>
               <a:t>編輯母片文字樣式</a:t>
             </a:r>
           </a:p>
@@ -2353,7 +2334,7 @@
           <a:p>
             <a:fld id="{5579B680-425F-405A-87B3-AF7CB6D33E03}" type="datetimeFigureOut">
               <a:rPr lang="zh-TW" altLang="en-US" smtClean="0"/>
-              <a:t>2022/5/25</a:t>
+              <a:t>2022/6/9</a:t>
             </a:fld>
             <a:endParaRPr lang="zh-TW" altLang="en-US"/>
           </a:p>
@@ -2462,10 +2443,9 @@
           <a:lstStyle/>
           <a:p>
             <a:r>
-              <a:rPr lang="zh-TW" altLang="en-US" smtClean="0"/>
+              <a:rPr lang="zh-TW" altLang="en-US"/>
               <a:t>按一下以編輯母片標題樣式</a:t>
             </a:r>
-            <a:endParaRPr lang="zh-TW" altLang="en-US"/>
           </a:p>
         </p:txBody>
       </p:sp>
@@ -2496,38 +2476,37 @@
           <a:p>
             <a:pPr lvl="0"/>
             <a:r>
-              <a:rPr lang="zh-TW" altLang="en-US" smtClean="0"/>
+              <a:rPr lang="zh-TW" altLang="en-US"/>
               <a:t>編輯母片文字樣式</a:t>
             </a:r>
           </a:p>
           <a:p>
             <a:pPr lvl="1"/>
             <a:r>
-              <a:rPr lang="zh-TW" altLang="en-US" smtClean="0"/>
+              <a:rPr lang="zh-TW" altLang="en-US"/>
               <a:t>第二層</a:t>
             </a:r>
           </a:p>
           <a:p>
             <a:pPr lvl="2"/>
             <a:r>
-              <a:rPr lang="zh-TW" altLang="en-US" smtClean="0"/>
+              <a:rPr lang="zh-TW" altLang="en-US"/>
               <a:t>第三層</a:t>
             </a:r>
           </a:p>
           <a:p>
             <a:pPr lvl="3"/>
             <a:r>
-              <a:rPr lang="zh-TW" altLang="en-US" smtClean="0"/>
+              <a:rPr lang="zh-TW" altLang="en-US"/>
               <a:t>第四層</a:t>
             </a:r>
           </a:p>
           <a:p>
             <a:pPr lvl="4"/>
             <a:r>
-              <a:rPr lang="zh-TW" altLang="en-US" smtClean="0"/>
+              <a:rPr lang="zh-TW" altLang="en-US"/>
               <a:t>第五層</a:t>
             </a:r>
-            <a:endParaRPr lang="zh-TW" altLang="en-US"/>
           </a:p>
         </p:txBody>
       </p:sp>
@@ -2566,7 +2545,7 @@
           <a:p>
             <a:fld id="{5579B680-425F-405A-87B3-AF7CB6D33E03}" type="datetimeFigureOut">
               <a:rPr lang="zh-TW" altLang="en-US" smtClean="0"/>
-              <a:t>2022/5/25</a:t>
+              <a:t>2022/6/9</a:t>
             </a:fld>
             <a:endParaRPr lang="zh-TW" altLang="en-US"/>
           </a:p>
@@ -2987,7 +2966,7 @@
           <a:lstStyle/>
           <a:p>
             <a:r>
-              <a:rPr lang="en-US" altLang="zh-TW" dirty="0" smtClean="0"/>
+              <a:rPr lang="en-US" altLang="zh-TW" dirty="0"/>
               <a:t>Programming Assignment for Chapter 18</a:t>
             </a:r>
             <a:endParaRPr lang="zh-TW" altLang="en-US" dirty="0"/>
@@ -3059,7 +3038,7 @@
           <a:lstStyle/>
           <a:p>
             <a:r>
-              <a:rPr lang="en-US" altLang="zh-TW" dirty="0" smtClean="0"/>
+              <a:rPr lang="en-US" altLang="zh-TW" dirty="0"/>
               <a:t>18.11 (Polynomial Class)</a:t>
             </a:r>
             <a:endParaRPr lang="zh-TW" altLang="en-US" dirty="0"/>
@@ -3087,7 +3066,7 @@
               <a:buNone/>
             </a:pPr>
             <a:r>
-              <a:rPr lang="en-US" altLang="zh-TW" dirty="0" smtClean="0"/>
+              <a:rPr lang="en-US" altLang="zh-TW" dirty="0"/>
               <a:t>Develop class Polynomial. The internal representation of a Polynomial is an array of terms. Each term contains a coefficient and an exponent, e.g., the term 2x4 has the coefficient 2 and the exponent 4. </a:t>
             </a:r>
           </a:p>
@@ -3096,7 +3075,7 @@
               <a:buNone/>
             </a:pPr>
             <a:r>
-              <a:rPr lang="en-US" altLang="zh-TW" dirty="0" smtClean="0"/>
+              <a:rPr lang="en-US" altLang="zh-TW" dirty="0"/>
               <a:t>Develop a complete class containing proper constructor and destructor functions as well as set and get functions. The class should also provide the following overloaded operator capabilities:</a:t>
             </a:r>
           </a:p>
@@ -3105,7 +3084,7 @@
               <a:buNone/>
             </a:pPr>
             <a:r>
-              <a:rPr lang="en-US" altLang="zh-TW" dirty="0" smtClean="0"/>
+              <a:rPr lang="en-US" altLang="zh-TW" dirty="0"/>
               <a:t>a) Overload the addition operator (+) to add two Polynomials.</a:t>
             </a:r>
           </a:p>
@@ -3114,7 +3093,7 @@
               <a:buNone/>
             </a:pPr>
             <a:r>
-              <a:rPr lang="en-US" altLang="zh-TW" dirty="0" smtClean="0"/>
+              <a:rPr lang="en-US" altLang="zh-TW" dirty="0"/>
               <a:t>b) Overload the subtraction operator (-) to subtract two Polynomials.</a:t>
             </a:r>
           </a:p>
@@ -3123,7 +3102,7 @@
               <a:buNone/>
             </a:pPr>
             <a:r>
-              <a:rPr lang="en-US" altLang="zh-TW" dirty="0" smtClean="0"/>
+              <a:rPr lang="en-US" altLang="zh-TW" dirty="0"/>
               <a:t>c) Overload the assignment operator to assign one Polynomial to another.</a:t>
             </a:r>
           </a:p>
@@ -3132,7 +3111,7 @@
               <a:buNone/>
             </a:pPr>
             <a:r>
-              <a:rPr lang="en-US" altLang="zh-TW" dirty="0" smtClean="0"/>
+              <a:rPr lang="en-US" altLang="zh-TW" dirty="0"/>
               <a:t>d) Overload the multiplication operator (*) to multiply two Polynomials.</a:t>
             </a:r>
           </a:p>
@@ -3141,7 +3120,7 @@
               <a:buNone/>
             </a:pPr>
             <a:r>
-              <a:rPr lang="en-US" altLang="zh-TW" dirty="0" smtClean="0"/>
+              <a:rPr lang="en-US" altLang="zh-TW" dirty="0"/>
               <a:t>e) Overload the addition assignment operator (+=), subtraction assignment operator (-=), and multiplication assignment operator (*=). </a:t>
             </a:r>
             <a:endParaRPr lang="zh-TW" altLang="en-US" dirty="0"/>
@@ -3194,7 +3173,7 @@
           <a:lstStyle/>
           <a:p>
             <a:r>
-              <a:rPr lang="en-US" altLang="zh-TW" dirty="0" smtClean="0"/>
+              <a:rPr lang="en-US" altLang="zh-TW" dirty="0"/>
               <a:t>Chapter 19: Base class Circle and derived class Sphere exercise.</a:t>
             </a:r>
             <a:endParaRPr lang="zh-TW" altLang="en-US" dirty="0"/>
@@ -3222,7 +3201,7 @@
               <a:buNone/>
             </a:pPr>
             <a:r>
-              <a:rPr lang="en-US" altLang="zh-TW" dirty="0" smtClean="0"/>
+              <a:rPr lang="en-US" altLang="zh-TW" dirty="0"/>
               <a:t>Create a Sphere class that inherits from a Circle class. We know that we can create a sphere object by turning a circle around its diameter. </a:t>
             </a:r>
           </a:p>
@@ -3231,7 +3210,7 @@
               <a:buNone/>
             </a:pPr>
             <a:r>
-              <a:rPr lang="en-US" altLang="zh-TW" dirty="0" smtClean="0"/>
+              <a:rPr lang="en-US" altLang="zh-TW" dirty="0"/>
               <a:t>a. Design an interface for a class named circle with one private data member:  radius. Define a parameter constructor and a destructor for the class and write member functions to find the perimeter and area of a circle using the following relationships. </a:t>
             </a:r>
           </a:p>
@@ -3240,8 +3219,8 @@
               <a:buNone/>
             </a:pPr>
             <a:r>
-              <a:rPr lang="en-US" altLang="zh-TW" dirty="0" smtClean="0"/>
-              <a:t>      perimeter = 2 * π * radius area = π * radius * radius</a:t>
+              <a:rPr lang="en-US" altLang="zh-TW" dirty="0"/>
+              <a:t>      perimeter = 2 * π * radius ,area = π * radius * radius</a:t>
             </a:r>
           </a:p>
           <a:p>
@@ -3249,7 +3228,7 @@
               <a:buNone/>
             </a:pPr>
             <a:r>
-              <a:rPr lang="en-US" altLang="zh-TW" dirty="0" smtClean="0"/>
+              <a:rPr lang="en-US" altLang="zh-TW" dirty="0"/>
               <a:t>b. Define an interface file for a class named Sphere. Also define a parameter constructor and a destructor for the class and write member functions to find the surface and volume of a sphere. </a:t>
             </a:r>
           </a:p>
@@ -3258,15 +3237,15 @@
               <a:buNone/>
             </a:pPr>
             <a:r>
-              <a:rPr lang="en-US" altLang="zh-TW" dirty="0" smtClean="0"/>
+              <a:rPr lang="en-US" altLang="zh-TW" dirty="0"/>
               <a:t>c. Define an implementation file for the class Sphere using the following </a:t>
             </a:r>
             <a:r>
-              <a:rPr lang="en-US" altLang="zh-TW" dirty="0" err="1" smtClean="0"/>
+              <a:rPr lang="en-US" altLang="zh-TW" dirty="0" err="1"/>
               <a:t>formulas</a:t>
             </a:r>
             <a:r>
-              <a:rPr lang="en-US" altLang="zh-TW" dirty="0" smtClean="0"/>
+              <a:rPr lang="en-US" altLang="zh-TW" dirty="0"/>
               <a:t> to find the surface and the volume of a sphere; in the formulas, perimeter is the perimeter of the circle and area is the area of the circle defined in part (b). </a:t>
             </a:r>
           </a:p>
@@ -3275,8 +3254,16 @@
               <a:buNone/>
             </a:pPr>
             <a:r>
-              <a:rPr lang="en-US" altLang="zh-TW" dirty="0" smtClean="0"/>
-              <a:t>      surface = 2 * radius * perimeter volume = (4 / 3) * radius * area</a:t>
+              <a:rPr lang="en-US" altLang="zh-TW" dirty="0"/>
+              <a:t>      surface = 2 * radius * </a:t>
+            </a:r>
+            <a:r>
+              <a:rPr lang="en-US" altLang="zh-TW"/>
+              <a:t>perimeter ,volume </a:t>
+            </a:r>
+            <a:r>
+              <a:rPr lang="en-US" altLang="zh-TW" dirty="0"/>
+              <a:t>= (4 / 3) * radius * area</a:t>
             </a:r>
           </a:p>
           <a:p>
@@ -3284,7 +3271,7 @@
               <a:buNone/>
             </a:pPr>
             <a:r>
-              <a:rPr lang="en-US" altLang="zh-TW" dirty="0" smtClean="0"/>
+              <a:rPr lang="en-US" altLang="zh-TW" dirty="0"/>
               <a:t>d. Write an application file to test the Circle and Sphere classes.</a:t>
             </a:r>
             <a:endParaRPr lang="zh-TW" altLang="en-US" dirty="0"/>

</xml_diff>